<commit_message>
add slide for Generalisation
</commit_message>
<xml_diff>
--- a/Literatuurstudie/Literatuurstudie_ppt - kopie.pptx
+++ b/Literatuurstudie/Literatuurstudie_ppt - kopie.pptx
@@ -6,10 +6,10 @@
     <p:sldMasterId id="2147483694" r:id="rId2"/>
   </p:sldMasterIdLst>
   <p:notesMasterIdLst>
-    <p:notesMasterId r:id="rId20"/>
+    <p:notesMasterId r:id="rId21"/>
   </p:notesMasterIdLst>
   <p:handoutMasterIdLst>
-    <p:handoutMasterId r:id="rId21"/>
+    <p:handoutMasterId r:id="rId22"/>
   </p:handoutMasterIdLst>
   <p:sldIdLst>
     <p:sldId id="261" r:id="rId3"/>
@@ -21,14 +21,15 @@
     <p:sldId id="279" r:id="rId9"/>
     <p:sldId id="281" r:id="rId10"/>
     <p:sldId id="282" r:id="rId11"/>
-    <p:sldId id="278" r:id="rId12"/>
-    <p:sldId id="275" r:id="rId13"/>
-    <p:sldId id="276" r:id="rId14"/>
-    <p:sldId id="272" r:id="rId15"/>
-    <p:sldId id="273" r:id="rId16"/>
-    <p:sldId id="274" r:id="rId17"/>
-    <p:sldId id="287" r:id="rId18"/>
-    <p:sldId id="285" r:id="rId19"/>
+    <p:sldId id="292" r:id="rId12"/>
+    <p:sldId id="278" r:id="rId13"/>
+    <p:sldId id="275" r:id="rId14"/>
+    <p:sldId id="276" r:id="rId15"/>
+    <p:sldId id="272" r:id="rId16"/>
+    <p:sldId id="273" r:id="rId17"/>
+    <p:sldId id="274" r:id="rId18"/>
+    <p:sldId id="287" r:id="rId19"/>
+    <p:sldId id="285" r:id="rId20"/>
   </p:sldIdLst>
   <p:sldSz cx="12192000" cy="6858000"/>
   <p:notesSz cx="6858000" cy="9144000"/>
@@ -5179,6 +5180,336 @@
       </p:grpSpPr>
       <p:sp>
         <p:nvSpPr>
+          <p:cNvPr id="2" name="Tijdelijke aanduiding voor inhoud 1">
+            <a:extLst>
+              <a:ext uri="{FF2B5EF4-FFF2-40B4-BE49-F238E27FC236}">
+                <a16:creationId xmlns:a16="http://schemas.microsoft.com/office/drawing/2014/main" id="{7B15AAC3-EC85-45D1-8E9F-E8A82D0022B9}"/>
+              </a:ext>
+            </a:extLst>
+          </p:cNvPr>
+          <p:cNvSpPr>
+            <a:spLocks noGrp="1"/>
+          </p:cNvSpPr>
+          <p:nvPr>
+            <p:ph idx="1"/>
+          </p:nvPr>
+        </p:nvSpPr>
+        <p:spPr/>
+        <p:txBody>
+          <a:bodyPr/>
+          <a:lstStyle/>
+          <a:p>
+            <a:r>
+              <a:rPr lang="nl-BE" dirty="0"/>
+              <a:t>Generaliseren = niet eerder geziene datapunten correct labelen</a:t>
+            </a:r>
+          </a:p>
+          <a:p>
+            <a:r>
+              <a:rPr lang="nl-BE" dirty="0"/>
+              <a:t>Doel van het netwerk: goed generaliseren</a:t>
+            </a:r>
+          </a:p>
+          <a:p>
+            <a:r>
+              <a:rPr lang="nl-BE" dirty="0"/>
+              <a:t>Kleine fout op </a:t>
+            </a:r>
+            <a:r>
+              <a:rPr lang="nl-BE" dirty="0" err="1"/>
+              <a:t>trainingsset</a:t>
+            </a:r>
+            <a:r>
+              <a:rPr lang="nl-BE" dirty="0"/>
+              <a:t> ≠ goede generalisatie</a:t>
+            </a:r>
+          </a:p>
+          <a:p>
+            <a:r>
+              <a:rPr lang="nl-BE" dirty="0"/>
+              <a:t>Voorbeeld:</a:t>
+            </a:r>
+          </a:p>
+        </p:txBody>
+      </p:sp>
+      <p:sp>
+        <p:nvSpPr>
+          <p:cNvPr id="3" name="Tijdelijke aanduiding voor voettekst 2">
+            <a:extLst>
+              <a:ext uri="{FF2B5EF4-FFF2-40B4-BE49-F238E27FC236}">
+                <a16:creationId xmlns:a16="http://schemas.microsoft.com/office/drawing/2014/main" id="{E8A64DED-D2C6-4420-BC5B-2AC9205393A1}"/>
+              </a:ext>
+            </a:extLst>
+          </p:cNvPr>
+          <p:cNvSpPr>
+            <a:spLocks noGrp="1"/>
+          </p:cNvSpPr>
+          <p:nvPr>
+            <p:ph type="ftr" sz="quarter" idx="11"/>
+          </p:nvPr>
+        </p:nvSpPr>
+        <p:spPr/>
+        <p:txBody>
+          <a:bodyPr/>
+          <a:lstStyle/>
+          <a:p>
+            <a:r>
+              <a:rPr lang="nl-NL"/>
+              <a:t>Faculteit wetenschappen</a:t>
+            </a:r>
+          </a:p>
+        </p:txBody>
+      </p:sp>
+      <p:sp>
+        <p:nvSpPr>
+          <p:cNvPr id="4" name="Tijdelijke aanduiding voor dianummer 3">
+            <a:extLst>
+              <a:ext uri="{FF2B5EF4-FFF2-40B4-BE49-F238E27FC236}">
+                <a16:creationId xmlns:a16="http://schemas.microsoft.com/office/drawing/2014/main" id="{7F0A9854-7366-4EB1-A83C-310994DA9FAD}"/>
+              </a:ext>
+            </a:extLst>
+          </p:cNvPr>
+          <p:cNvSpPr>
+            <a:spLocks noGrp="1"/>
+          </p:cNvSpPr>
+          <p:nvPr>
+            <p:ph type="sldNum" sz="quarter" idx="12"/>
+          </p:nvPr>
+        </p:nvSpPr>
+        <p:spPr/>
+        <p:txBody>
+          <a:bodyPr/>
+          <a:lstStyle/>
+          <a:p>
+            <a:fld id="{0A297500-7527-634B-90F4-69D0994C32B4}" type="slidenum">
+              <a:rPr lang="nl-NL" smtClean="0"/>
+              <a:t>10</a:t>
+            </a:fld>
+            <a:endParaRPr lang="nl-NL"/>
+          </a:p>
+        </p:txBody>
+      </p:sp>
+      <p:sp>
+        <p:nvSpPr>
+          <p:cNvPr id="5" name="Titel 4">
+            <a:extLst>
+              <a:ext uri="{FF2B5EF4-FFF2-40B4-BE49-F238E27FC236}">
+                <a16:creationId xmlns:a16="http://schemas.microsoft.com/office/drawing/2014/main" id="{8A84179C-9F94-4D4E-B3FC-8F2E911336DF}"/>
+              </a:ext>
+            </a:extLst>
+          </p:cNvPr>
+          <p:cNvSpPr>
+            <a:spLocks noGrp="1"/>
+          </p:cNvSpPr>
+          <p:nvPr>
+            <p:ph type="title"/>
+          </p:nvPr>
+        </p:nvSpPr>
+        <p:spPr/>
+        <p:txBody>
+          <a:bodyPr/>
+          <a:lstStyle/>
+          <a:p>
+            <a:r>
+              <a:rPr lang="nl-BE" dirty="0"/>
+              <a:t>Generaliseren</a:t>
+            </a:r>
+          </a:p>
+        </p:txBody>
+      </p:sp>
+      <p:pic>
+        <p:nvPicPr>
+          <p:cNvPr id="1026" name="Picture 2" descr="The concept of overfitting and model regularization. | Download Scientific  Diagram">
+            <a:extLst>
+              <a:ext uri="{FF2B5EF4-FFF2-40B4-BE49-F238E27FC236}">
+                <a16:creationId xmlns:a16="http://schemas.microsoft.com/office/drawing/2014/main" id="{A7595FAA-256C-4BB1-AA66-2A41536F4047}"/>
+              </a:ext>
+            </a:extLst>
+          </p:cNvPr>
+          <p:cNvPicPr>
+            <a:picLocks noChangeAspect="1" noChangeArrowheads="1"/>
+          </p:cNvPicPr>
+          <p:nvPr/>
+        </p:nvPicPr>
+        <p:blipFill rotWithShape="1">
+          <a:blip r:embed="rId2">
+            <a:extLst>
+              <a:ext uri="{28A0092B-C50C-407E-A947-70E740481C1C}">
+                <a14:useLocalDpi xmlns:a14="http://schemas.microsoft.com/office/drawing/2010/main" val="0"/>
+              </a:ext>
+            </a:extLst>
+          </a:blip>
+          <a:srcRect l="6480" t="1471" r="33872" b="59290"/>
+          <a:stretch/>
+        </p:blipFill>
+        <p:spPr bwMode="auto">
+          <a:xfrm>
+            <a:off x="2483344" y="3280892"/>
+            <a:ext cx="2840736" cy="2691000"/>
+          </a:xfrm>
+          <a:prstGeom prst="rect">
+            <a:avLst/>
+          </a:prstGeom>
+          <a:noFill/>
+          <a:extLst>
+            <a:ext uri="{909E8E84-426E-40DD-AFC4-6F175D3DCCD1}">
+              <a14:hiddenFill xmlns:a14="http://schemas.microsoft.com/office/drawing/2010/main">
+                <a:solidFill>
+                  <a:srgbClr val="FFFFFF"/>
+                </a:solidFill>
+              </a14:hiddenFill>
+            </a:ext>
+          </a:extLst>
+        </p:spPr>
+      </p:pic>
+      <p:pic>
+        <p:nvPicPr>
+          <p:cNvPr id="6" name="Picture 2" descr="The concept of overfitting and model regularization. | Download Scientific  Diagram">
+            <a:extLst>
+              <a:ext uri="{FF2B5EF4-FFF2-40B4-BE49-F238E27FC236}">
+                <a16:creationId xmlns:a16="http://schemas.microsoft.com/office/drawing/2014/main" id="{588259E7-6B1B-4F2F-BD59-9D72ECF2CA04}"/>
+              </a:ext>
+            </a:extLst>
+          </p:cNvPr>
+          <p:cNvPicPr>
+            <a:picLocks noChangeAspect="1" noChangeArrowheads="1"/>
+          </p:cNvPicPr>
+          <p:nvPr/>
+        </p:nvPicPr>
+        <p:blipFill rotWithShape="1">
+          <a:blip r:embed="rId2">
+            <a:extLst>
+              <a:ext uri="{28A0092B-C50C-407E-A947-70E740481C1C}">
+                <a14:useLocalDpi xmlns:a14="http://schemas.microsoft.com/office/drawing/2010/main" val="0"/>
+              </a:ext>
+            </a:extLst>
+          </a:blip>
+          <a:srcRect l="9906" t="44083" r="30446" b="16678"/>
+          <a:stretch/>
+        </p:blipFill>
+        <p:spPr bwMode="auto">
+          <a:xfrm>
+            <a:off x="6867921" y="3019347"/>
+            <a:ext cx="2840736" cy="2691000"/>
+          </a:xfrm>
+          <a:prstGeom prst="rect">
+            <a:avLst/>
+          </a:prstGeom>
+          <a:noFill/>
+          <a:extLst>
+            <a:ext uri="{909E8E84-426E-40DD-AFC4-6F175D3DCCD1}">
+              <a14:hiddenFill xmlns:a14="http://schemas.microsoft.com/office/drawing/2010/main">
+                <a:solidFill>
+                  <a:srgbClr val="FFFFFF"/>
+                </a:solidFill>
+              </a14:hiddenFill>
+            </a:ext>
+          </a:extLst>
+        </p:spPr>
+      </p:pic>
+      <p:sp>
+        <p:nvSpPr>
+          <p:cNvPr id="8" name="Tekstvak 7">
+            <a:extLst>
+              <a:ext uri="{FF2B5EF4-FFF2-40B4-BE49-F238E27FC236}">
+                <a16:creationId xmlns:a16="http://schemas.microsoft.com/office/drawing/2014/main" id="{86DE54DD-E4EC-44B3-85D6-0238701BD047}"/>
+              </a:ext>
+            </a:extLst>
+          </p:cNvPr>
+          <p:cNvSpPr txBox="1"/>
+          <p:nvPr/>
+        </p:nvSpPr>
+        <p:spPr>
+          <a:xfrm>
+            <a:off x="3285594" y="5827624"/>
+            <a:ext cx="1236236" cy="369332"/>
+          </a:xfrm>
+          <a:prstGeom prst="rect">
+            <a:avLst/>
+          </a:prstGeom>
+          <a:noFill/>
+        </p:spPr>
+        <p:txBody>
+          <a:bodyPr wrap="none" rtlCol="0">
+            <a:spAutoFit/>
+          </a:bodyPr>
+          <a:lstStyle/>
+          <a:p>
+            <a:r>
+              <a:rPr lang="nl-BE" dirty="0" err="1"/>
+              <a:t>Overfitting</a:t>
+            </a:r>
+            <a:endParaRPr lang="nl-BE" dirty="0"/>
+          </a:p>
+        </p:txBody>
+      </p:sp>
+      <p:sp>
+        <p:nvSpPr>
+          <p:cNvPr id="9" name="Tekstvak 8">
+            <a:extLst>
+              <a:ext uri="{FF2B5EF4-FFF2-40B4-BE49-F238E27FC236}">
+                <a16:creationId xmlns:a16="http://schemas.microsoft.com/office/drawing/2014/main" id="{12F50B14-AFCD-4661-A975-57C7F9886868}"/>
+              </a:ext>
+            </a:extLst>
+          </p:cNvPr>
+          <p:cNvSpPr txBox="1"/>
+          <p:nvPr/>
+        </p:nvSpPr>
+        <p:spPr>
+          <a:xfrm>
+            <a:off x="7170034" y="5795358"/>
+            <a:ext cx="2236510" cy="369332"/>
+          </a:xfrm>
+          <a:prstGeom prst="rect">
+            <a:avLst/>
+          </a:prstGeom>
+          <a:noFill/>
+        </p:spPr>
+        <p:txBody>
+          <a:bodyPr wrap="none" rtlCol="0">
+            <a:spAutoFit/>
+          </a:bodyPr>
+          <a:lstStyle/>
+          <a:p>
+            <a:r>
+              <a:rPr lang="nl-BE" dirty="0"/>
+              <a:t>Betere generalisatie</a:t>
+            </a:r>
+          </a:p>
+        </p:txBody>
+      </p:sp>
+    </p:spTree>
+    <p:extLst>
+      <p:ext uri="{BB962C8B-B14F-4D97-AF65-F5344CB8AC3E}">
+        <p14:creationId xmlns:p14="http://schemas.microsoft.com/office/powerpoint/2010/main" val="1586123568"/>
+      </p:ext>
+    </p:extLst>
+  </p:cSld>
+  <p:clrMapOvr>
+    <a:masterClrMapping/>
+  </p:clrMapOvr>
+</p:sld>
+</file>
+
+<file path=ppt/slides/slide11.xml><?xml version="1.0" encoding="utf-8"?>
+<p:sld xmlns:a="http://schemas.openxmlformats.org/drawingml/2006/main" xmlns:r="http://schemas.openxmlformats.org/officeDocument/2006/relationships" xmlns:p="http://schemas.openxmlformats.org/presentationml/2006/main">
+  <p:cSld>
+    <p:spTree>
+      <p:nvGrpSpPr>
+        <p:cNvPr id="1" name=""/>
+        <p:cNvGrpSpPr/>
+        <p:nvPr/>
+      </p:nvGrpSpPr>
+      <p:grpSpPr>
+        <a:xfrm>
+          <a:off x="0" y="0"/>
+          <a:ext cx="0" cy="0"/>
+          <a:chOff x="0" y="0"/>
+          <a:chExt cx="0" cy="0"/>
+        </a:xfrm>
+      </p:grpSpPr>
+      <p:sp>
+        <p:nvSpPr>
           <p:cNvPr id="2" name="Content Placeholder 1">
             <a:extLst>
               <a:ext uri="{FF2B5EF4-FFF2-40B4-BE49-F238E27FC236}">
@@ -5326,7 +5657,7 @@
           <a:p>
             <a:fld id="{0A297500-7527-634B-90F4-69D0994C32B4}" type="slidenum">
               <a:rPr lang="nl-NL" smtClean="0"/>
-              <a:t>10</a:t>
+              <a:t>11</a:t>
             </a:fld>
             <a:endParaRPr lang="nl-NL"/>
           </a:p>
@@ -5442,7 +5773,7 @@
 </p:sld>
 </file>
 
-<file path=ppt/slides/slide11.xml><?xml version="1.0" encoding="utf-8"?>
+<file path=ppt/slides/slide12.xml><?xml version="1.0" encoding="utf-8"?>
 <p:sld xmlns:a="http://schemas.openxmlformats.org/drawingml/2006/main" xmlns:r="http://schemas.openxmlformats.org/officeDocument/2006/relationships" xmlns:p="http://schemas.openxmlformats.org/presentationml/2006/main">
   <p:cSld>
     <p:spTree>
@@ -5780,7 +6111,7 @@
           <a:p>
             <a:fld id="{0A297500-7527-634B-90F4-69D0994C32B4}" type="slidenum">
               <a:rPr lang="nl-NL" smtClean="0"/>
-              <a:t>11</a:t>
+              <a:t>12</a:t>
             </a:fld>
             <a:endParaRPr lang="nl-NL"/>
           </a:p>
@@ -5926,7 +6257,7 @@
 </p:sld>
 </file>
 
-<file path=ppt/slides/slide12.xml><?xml version="1.0" encoding="utf-8"?>
+<file path=ppt/slides/slide13.xml><?xml version="1.0" encoding="utf-8"?>
 <p:sld xmlns:a="http://schemas.openxmlformats.org/drawingml/2006/main" xmlns:r="http://schemas.openxmlformats.org/officeDocument/2006/relationships" xmlns:p="http://schemas.openxmlformats.org/presentationml/2006/main">
   <p:cSld>
     <p:spTree>
@@ -6182,7 +6513,7 @@
           <a:p>
             <a:fld id="{0A297500-7527-634B-90F4-69D0994C32B4}" type="slidenum">
               <a:rPr lang="nl-NL" smtClean="0"/>
-              <a:t>12</a:t>
+              <a:t>13</a:t>
             </a:fld>
             <a:endParaRPr lang="nl-NL"/>
           </a:p>
@@ -6374,7 +6705,7 @@
 </p:sld>
 </file>
 
-<file path=ppt/slides/slide13.xml><?xml version="1.0" encoding="utf-8"?>
+<file path=ppt/slides/slide14.xml><?xml version="1.0" encoding="utf-8"?>
 <p:sld xmlns:a="http://schemas.openxmlformats.org/drawingml/2006/main" xmlns:r="http://schemas.openxmlformats.org/officeDocument/2006/relationships" xmlns:p="http://schemas.openxmlformats.org/presentationml/2006/main">
   <p:cSld>
     <p:spTree>
@@ -6488,7 +6819,7 @@
           <a:p>
             <a:fld id="{0A297500-7527-634B-90F4-69D0994C32B4}" type="slidenum">
               <a:rPr lang="nl-NL" smtClean="0"/>
-              <a:t>13</a:t>
+              <a:t>14</a:t>
             </a:fld>
             <a:endParaRPr lang="nl-NL"/>
           </a:p>
@@ -6565,7 +6896,7 @@
 </p:sld>
 </file>
 
-<file path=ppt/slides/slide14.xml><?xml version="1.0" encoding="utf-8"?>
+<file path=ppt/slides/slide15.xml><?xml version="1.0" encoding="utf-8"?>
 <p:sld xmlns:a="http://schemas.openxmlformats.org/drawingml/2006/main" xmlns:r="http://schemas.openxmlformats.org/officeDocument/2006/relationships" xmlns:p="http://schemas.openxmlformats.org/presentationml/2006/main">
   <p:cSld>
     <p:spTree>
@@ -7088,7 +7419,7 @@
           <a:p>
             <a:fld id="{0A297500-7527-634B-90F4-69D0994C32B4}" type="slidenum">
               <a:rPr lang="nl-NL" smtClean="0"/>
-              <a:t>14</a:t>
+              <a:t>15</a:t>
             </a:fld>
             <a:endParaRPr lang="nl-NL" dirty="0"/>
           </a:p>
@@ -7253,7 +7584,7 @@
 </p:sld>
 </file>
 
-<file path=ppt/slides/slide15.xml><?xml version="1.0" encoding="utf-8"?>
+<file path=ppt/slides/slide16.xml><?xml version="1.0" encoding="utf-8"?>
 <p:sld xmlns:a="http://schemas.openxmlformats.org/drawingml/2006/main" xmlns:r="http://schemas.openxmlformats.org/officeDocument/2006/relationships" xmlns:p="http://schemas.openxmlformats.org/presentationml/2006/main">
   <p:cSld>
     <p:spTree>
@@ -7366,7 +7697,7 @@
           <a:p>
             <a:fld id="{0A297500-7527-634B-90F4-69D0994C32B4}" type="slidenum">
               <a:rPr lang="nl-NL" smtClean="0"/>
-              <a:t>15</a:t>
+              <a:t>16</a:t>
             </a:fld>
             <a:endParaRPr lang="nl-NL"/>
           </a:p>
@@ -7479,66 +7810,6 @@
 </p:sld>
 </file>
 
-<file path=ppt/slides/slide16.xml><?xml version="1.0" encoding="utf-8"?>
-<p:sld xmlns:a="http://schemas.openxmlformats.org/drawingml/2006/main" xmlns:r="http://schemas.openxmlformats.org/officeDocument/2006/relationships" xmlns:p="http://schemas.openxmlformats.org/presentationml/2006/main">
-  <p:cSld>
-    <p:spTree>
-      <p:nvGrpSpPr>
-        <p:cNvPr id="1" name=""/>
-        <p:cNvGrpSpPr/>
-        <p:nvPr/>
-      </p:nvGrpSpPr>
-      <p:grpSpPr>
-        <a:xfrm>
-          <a:off x="0" y="0"/>
-          <a:ext cx="0" cy="0"/>
-          <a:chOff x="0" y="0"/>
-          <a:chExt cx="0" cy="0"/>
-        </a:xfrm>
-      </p:grpSpPr>
-      <p:sp>
-        <p:nvSpPr>
-          <p:cNvPr id="8" name="Titel 7"/>
-          <p:cNvSpPr>
-            <a:spLocks noGrp="1"/>
-          </p:cNvSpPr>
-          <p:nvPr>
-            <p:ph type="ctrTitle"/>
-          </p:nvPr>
-        </p:nvSpPr>
-        <p:spPr>
-          <a:xfrm>
-            <a:off x="575998" y="1080000"/>
-            <a:ext cx="10299148" cy="4024798"/>
-          </a:xfrm>
-        </p:spPr>
-        <p:txBody>
-          <a:bodyPr>
-            <a:normAutofit/>
-          </a:bodyPr>
-          <a:lstStyle/>
-          <a:p>
-            <a:pPr algn="ctr"/>
-            <a:r>
-              <a:rPr lang="nl-NL" sz="8000" dirty="0"/>
-              <a:t>Vragen?</a:t>
-            </a:r>
-          </a:p>
-        </p:txBody>
-      </p:sp>
-    </p:spTree>
-    <p:extLst>
-      <p:ext uri="{BB962C8B-B14F-4D97-AF65-F5344CB8AC3E}">
-        <p14:creationId xmlns:p14="http://schemas.microsoft.com/office/powerpoint/2010/main" val="2576386695"/>
-      </p:ext>
-    </p:extLst>
-  </p:cSld>
-  <p:clrMapOvr>
-    <a:masterClrMapping/>
-  </p:clrMapOvr>
-</p:sld>
-</file>
-
 <file path=ppt/slides/slide17.xml><?xml version="1.0" encoding="utf-8"?>
 <p:sld xmlns:a="http://schemas.openxmlformats.org/drawingml/2006/main" xmlns:r="http://schemas.openxmlformats.org/officeDocument/2006/relationships" xmlns:p="http://schemas.openxmlformats.org/presentationml/2006/main">
   <p:cSld>
@@ -7558,6 +7829,66 @@
       </p:grpSpPr>
       <p:sp>
         <p:nvSpPr>
+          <p:cNvPr id="8" name="Titel 7"/>
+          <p:cNvSpPr>
+            <a:spLocks noGrp="1"/>
+          </p:cNvSpPr>
+          <p:nvPr>
+            <p:ph type="ctrTitle"/>
+          </p:nvPr>
+        </p:nvSpPr>
+        <p:spPr>
+          <a:xfrm>
+            <a:off x="575998" y="1080000"/>
+            <a:ext cx="10299148" cy="4024798"/>
+          </a:xfrm>
+        </p:spPr>
+        <p:txBody>
+          <a:bodyPr>
+            <a:normAutofit/>
+          </a:bodyPr>
+          <a:lstStyle/>
+          <a:p>
+            <a:pPr algn="ctr"/>
+            <a:r>
+              <a:rPr lang="nl-NL" sz="8000" dirty="0"/>
+              <a:t>Vragen?</a:t>
+            </a:r>
+          </a:p>
+        </p:txBody>
+      </p:sp>
+    </p:spTree>
+    <p:extLst>
+      <p:ext uri="{BB962C8B-B14F-4D97-AF65-F5344CB8AC3E}">
+        <p14:creationId xmlns:p14="http://schemas.microsoft.com/office/powerpoint/2010/main" val="2576386695"/>
+      </p:ext>
+    </p:extLst>
+  </p:cSld>
+  <p:clrMapOvr>
+    <a:masterClrMapping/>
+  </p:clrMapOvr>
+</p:sld>
+</file>
+
+<file path=ppt/slides/slide18.xml><?xml version="1.0" encoding="utf-8"?>
+<p:sld xmlns:a="http://schemas.openxmlformats.org/drawingml/2006/main" xmlns:r="http://schemas.openxmlformats.org/officeDocument/2006/relationships" xmlns:p="http://schemas.openxmlformats.org/presentationml/2006/main">
+  <p:cSld>
+    <p:spTree>
+      <p:nvGrpSpPr>
+        <p:cNvPr id="1" name=""/>
+        <p:cNvGrpSpPr/>
+        <p:nvPr/>
+      </p:nvGrpSpPr>
+      <p:grpSpPr>
+        <a:xfrm>
+          <a:off x="0" y="0"/>
+          <a:ext cx="0" cy="0"/>
+          <a:chOff x="0" y="0"/>
+          <a:chExt cx="0" cy="0"/>
+        </a:xfrm>
+      </p:grpSpPr>
+      <p:sp>
+        <p:nvSpPr>
           <p:cNvPr id="2" name="Tijdelijke aanduiding voor inhoud 1">
             <a:extLst>
               <a:ext uri="{FF2B5EF4-FFF2-40B4-BE49-F238E27FC236}">
@@ -7941,7 +8272,7 @@
           <a:p>
             <a:fld id="{0A297500-7527-634B-90F4-69D0994C32B4}" type="slidenum">
               <a:rPr lang="nl-NL" smtClean="0"/>
-              <a:t>17</a:t>
+              <a:t>18</a:t>
             </a:fld>
             <a:endParaRPr lang="nl-NL"/>
           </a:p>
@@ -10015,8 +10346,8 @@
           <a:chExt cx="0" cy="0"/>
         </a:xfrm>
       </p:grpSpPr>
-      <mc:AlternateContent xmlns:mc="http://schemas.openxmlformats.org/markup-compatibility/2006">
-        <mc:Choice xmlns:a14="http://schemas.microsoft.com/office/drawing/2010/main" Requires="a14">
+      <mc:AlternateContent xmlns:mc="http://schemas.openxmlformats.org/markup-compatibility/2006" xmlns:a14="http://schemas.microsoft.com/office/drawing/2010/main">
+        <mc:Choice Requires="a14">
           <p:sp>
             <p:nvSpPr>
               <p:cNvPr id="2" name="Tijdelijke aanduiding voor inhoud 1">
@@ -10267,7 +10598,7 @@
             </p:txBody>
           </p:sp>
         </mc:Choice>
-        <mc:Fallback>
+        <mc:Fallback xmlns="">
           <p:sp>
             <p:nvSpPr>
               <p:cNvPr id="2" name="Tijdelijke aanduiding voor inhoud 1">
@@ -10478,8 +10809,8 @@
           <a:chExt cx="0" cy="0"/>
         </a:xfrm>
       </p:grpSpPr>
-      <mc:AlternateContent xmlns:mc="http://schemas.openxmlformats.org/markup-compatibility/2006">
-        <mc:Choice xmlns:a14="http://schemas.microsoft.com/office/drawing/2010/main" Requires="a14">
+      <mc:AlternateContent xmlns:mc="http://schemas.openxmlformats.org/markup-compatibility/2006" xmlns:a14="http://schemas.microsoft.com/office/drawing/2010/main">
+        <mc:Choice Requires="a14">
           <p:sp>
             <p:nvSpPr>
               <p:cNvPr id="2" name="Tijdelijke aanduiding voor inhoud 1">
@@ -10784,7 +11115,7 @@
             </p:txBody>
           </p:sp>
         </mc:Choice>
-        <mc:Fallback>
+        <mc:Fallback xmlns="">
           <p:sp>
             <p:nvSpPr>
               <p:cNvPr id="2" name="Tijdelijke aanduiding voor inhoud 1">
@@ -11477,8 +11808,8 @@
           <a:chExt cx="0" cy="0"/>
         </a:xfrm>
       </p:grpSpPr>
-      <mc:AlternateContent xmlns:mc="http://schemas.openxmlformats.org/markup-compatibility/2006">
-        <mc:Choice xmlns:a14="http://schemas.microsoft.com/office/drawing/2010/main" Requires="a14">
+      <mc:AlternateContent xmlns:mc="http://schemas.openxmlformats.org/markup-compatibility/2006" xmlns:a14="http://schemas.microsoft.com/office/drawing/2010/main">
+        <mc:Choice Requires="a14">
           <p:sp>
             <p:nvSpPr>
               <p:cNvPr id="2" name="Tijdelijke aanduiding voor inhoud 1">
@@ -11672,7 +12003,7 @@
             </p:txBody>
           </p:sp>
         </mc:Choice>
-        <mc:Fallback>
+        <mc:Fallback xmlns="">
           <p:sp>
             <p:nvSpPr>
               <p:cNvPr id="2" name="Tijdelijke aanduiding voor inhoud 1">

</xml_diff>

<commit_message>
remove oplossing? from slide 14
</commit_message>
<xml_diff>
--- a/Literatuurstudie/Literatuurstudie_ppt - kopie.pptx
+++ b/Literatuurstudie/Literatuurstudie_ppt - kopie.pptx
@@ -6758,12 +6758,6 @@
             <a:r>
               <a:rPr lang="nl-BE" dirty="0"/>
               <a:t>Motivatie om onzekerheid te kwantificeren</a:t>
-            </a:r>
-          </a:p>
-          <a:p>
-            <a:r>
-              <a:rPr lang="nl-BE" dirty="0"/>
-              <a:t>Oplossing?</a:t>
             </a:r>
           </a:p>
         </p:txBody>

</xml_diff>